<commit_message>
Week 4 Homework- Julio's IMDb Tour
This is the third version of my IMDb tour.
</commit_message>
<xml_diff>
--- a/Week04-Tours/Homework/Week 4 Homework-IMDb Tour-Julio Madrid.pptx
+++ b/Week04-Tours/Homework/Week 4 Homework-IMDb Tour-Julio Madrid.pptx
@@ -263,7 +263,7 @@
           <a:p>
             <a:fld id="{30450916-ED6A-46E3-AB56-D21E556239AF}" type="datetimeFigureOut">
               <a:rPr lang="en-US" smtClean="0"/>
-              <a:t>3/8/2022</a:t>
+              <a:t>3/17/2022</a:t>
             </a:fld>
             <a:endParaRPr lang="en-US"/>
           </a:p>
@@ -461,7 +461,7 @@
           <a:p>
             <a:fld id="{30450916-ED6A-46E3-AB56-D21E556239AF}" type="datetimeFigureOut">
               <a:rPr lang="en-US" smtClean="0"/>
-              <a:t>3/8/2022</a:t>
+              <a:t>3/17/2022</a:t>
             </a:fld>
             <a:endParaRPr lang="en-US"/>
           </a:p>
@@ -669,7 +669,7 @@
           <a:p>
             <a:fld id="{30450916-ED6A-46E3-AB56-D21E556239AF}" type="datetimeFigureOut">
               <a:rPr lang="en-US" smtClean="0"/>
-              <a:t>3/8/2022</a:t>
+              <a:t>3/17/2022</a:t>
             </a:fld>
             <a:endParaRPr lang="en-US"/>
           </a:p>
@@ -867,7 +867,7 @@
           <a:p>
             <a:fld id="{30450916-ED6A-46E3-AB56-D21E556239AF}" type="datetimeFigureOut">
               <a:rPr lang="en-US" smtClean="0"/>
-              <a:t>3/8/2022</a:t>
+              <a:t>3/17/2022</a:t>
             </a:fld>
             <a:endParaRPr lang="en-US"/>
           </a:p>
@@ -1142,7 +1142,7 @@
           <a:p>
             <a:fld id="{30450916-ED6A-46E3-AB56-D21E556239AF}" type="datetimeFigureOut">
               <a:rPr lang="en-US" smtClean="0"/>
-              <a:t>3/8/2022</a:t>
+              <a:t>3/17/2022</a:t>
             </a:fld>
             <a:endParaRPr lang="en-US"/>
           </a:p>
@@ -1407,7 +1407,7 @@
           <a:p>
             <a:fld id="{30450916-ED6A-46E3-AB56-D21E556239AF}" type="datetimeFigureOut">
               <a:rPr lang="en-US" smtClean="0"/>
-              <a:t>3/8/2022</a:t>
+              <a:t>3/17/2022</a:t>
             </a:fld>
             <a:endParaRPr lang="en-US"/>
           </a:p>
@@ -1819,7 +1819,7 @@
           <a:p>
             <a:fld id="{30450916-ED6A-46E3-AB56-D21E556239AF}" type="datetimeFigureOut">
               <a:rPr lang="en-US" smtClean="0"/>
-              <a:t>3/8/2022</a:t>
+              <a:t>3/17/2022</a:t>
             </a:fld>
             <a:endParaRPr lang="en-US"/>
           </a:p>
@@ -1960,7 +1960,7 @@
           <a:p>
             <a:fld id="{30450916-ED6A-46E3-AB56-D21E556239AF}" type="datetimeFigureOut">
               <a:rPr lang="en-US" smtClean="0"/>
-              <a:t>3/8/2022</a:t>
+              <a:t>3/17/2022</a:t>
             </a:fld>
             <a:endParaRPr lang="en-US"/>
           </a:p>
@@ -2073,7 +2073,7 @@
           <a:p>
             <a:fld id="{30450916-ED6A-46E3-AB56-D21E556239AF}" type="datetimeFigureOut">
               <a:rPr lang="en-US" smtClean="0"/>
-              <a:t>3/8/2022</a:t>
+              <a:t>3/17/2022</a:t>
             </a:fld>
             <a:endParaRPr lang="en-US"/>
           </a:p>
@@ -2414,7 +2414,7 @@
           <a:p>
             <a:fld id="{30450916-ED6A-46E3-AB56-D21E556239AF}" type="datetimeFigureOut">
               <a:rPr lang="en-US" smtClean="0"/>
-              <a:t>3/8/2022</a:t>
+              <a:t>3/17/2022</a:t>
             </a:fld>
             <a:endParaRPr lang="en-US"/>
           </a:p>
@@ -2702,7 +2702,7 @@
           <a:p>
             <a:fld id="{30450916-ED6A-46E3-AB56-D21E556239AF}" type="datetimeFigureOut">
               <a:rPr lang="en-US" smtClean="0"/>
-              <a:t>3/8/2022</a:t>
+              <a:t>3/17/2022</a:t>
             </a:fld>
             <a:endParaRPr lang="en-US"/>
           </a:p>
@@ -2943,7 +2943,7 @@
           <a:p>
             <a:fld id="{30450916-ED6A-46E3-AB56-D21E556239AF}" type="datetimeFigureOut">
               <a:rPr lang="en-US" smtClean="0"/>
-              <a:t>3/8/2022</a:t>
+              <a:t>3/17/2022</a:t>
             </a:fld>
             <a:endParaRPr lang="en-US"/>
           </a:p>
@@ -3612,12 +3612,8 @@
           <a:p>
             <a:pPr algn="ctr"/>
             <a:r>
-              <a:rPr lang="en-US" sz="2000" dirty="0"/>
-              <a:t>Ratings f</a:t>
-            </a:r>
-            <a:r>
               <a:rPr lang="en-US" dirty="0"/>
-              <a:t>or recently viewed media can be displayed here</a:t>
+              <a:t>Ratings for recently viewed media are displayed here</a:t>
             </a:r>
           </a:p>
         </p:txBody>
@@ -3794,8 +3790,13 @@
             <a:pPr algn="ctr"/>
             <a:r>
               <a:rPr lang="en-US" dirty="0"/>
-              <a:t>Find several movies  and TV shows that interest you? Organize them in the watchlist</a:t>
-            </a:r>
+              <a:t>Found several movies  and TV shows that interest you? Organize them in </a:t>
+            </a:r>
+            <a:r>
+              <a:rPr lang="en-US"/>
+              <a:t>the Watchlist</a:t>
+            </a:r>
+            <a:endParaRPr lang="en-US" dirty="0"/>
           </a:p>
         </p:txBody>
       </p:sp>

</xml_diff>